<commit_message>
Added instructions to build Maven project prior to IDE import. Added dependency for Table API
</commit_message>
<xml_diff>
--- a/slides/flink_table.pptx
+++ b/slides/flink_table.pptx
@@ -5,7 +5,7 @@
     <p:sldMasterId id="2147483660" r:id="rId1"/>
   </p:sldMasterIdLst>
   <p:notesMasterIdLst>
-    <p:notesMasterId r:id="rId12"/>
+    <p:notesMasterId r:id="rId13"/>
   </p:notesMasterIdLst>
   <p:sldIdLst>
     <p:sldId id="258" r:id="rId2"/>
@@ -13,11 +13,12 @@
     <p:sldId id="286" r:id="rId4"/>
     <p:sldId id="349" r:id="rId5"/>
     <p:sldId id="351" r:id="rId6"/>
-    <p:sldId id="352" r:id="rId7"/>
-    <p:sldId id="353" r:id="rId8"/>
-    <p:sldId id="354" r:id="rId9"/>
-    <p:sldId id="356" r:id="rId10"/>
-    <p:sldId id="361" r:id="rId11"/>
+    <p:sldId id="363" r:id="rId7"/>
+    <p:sldId id="352" r:id="rId8"/>
+    <p:sldId id="353" r:id="rId9"/>
+    <p:sldId id="354" r:id="rId10"/>
+    <p:sldId id="356" r:id="rId11"/>
+    <p:sldId id="361" r:id="rId12"/>
   </p:sldIdLst>
   <p:sldSz cx="9144000" cy="6858000" type="screen4x3"/>
   <p:notesSz cx="6858000" cy="9144000"/>
@@ -217,7 +218,7 @@
           <a:p>
             <a:fld id="{F01141F9-3E73-7448-86C2-E96D93FE379F}" type="datetimeFigureOut">
               <a:rPr lang="en-US" smtClean="0"/>
-              <a:t>15/06/15</a:t>
+              <a:t>18/06/15</a:t>
             </a:fld>
             <a:endParaRPr lang="en-US"/>
           </a:p>
@@ -4074,27 +4075,7 @@
                 <a:latin typeface="Avenir Next Regular"/>
                 <a:cs typeface="Avenir Next Regular"/>
               </a:rPr>
-              <a:t>June </a:t>
-            </a:r>
-            <a:r>
-              <a:rPr lang="en-US" dirty="0" smtClean="0">
-                <a:solidFill>
-                  <a:schemeClr val="bg1"/>
-                </a:solidFill>
-                <a:latin typeface="Avenir Next Regular"/>
-                <a:cs typeface="Avenir Next Regular"/>
-              </a:rPr>
-              <a:t>15th, </a:t>
-            </a:r>
-            <a:r>
-              <a:rPr lang="en-US" dirty="0" smtClean="0">
-                <a:solidFill>
-                  <a:schemeClr val="bg1"/>
-                </a:solidFill>
-                <a:latin typeface="Avenir Next Regular"/>
-                <a:cs typeface="Avenir Next Regular"/>
-              </a:rPr>
-              <a:t>2015</a:t>
+              <a:t>June 15th, 2015</a:t>
             </a:r>
             <a:endParaRPr lang="en-US" dirty="0">
               <a:solidFill>
@@ -4138,7 +4119,7 @@
       </p:grpSpPr>
       <p:sp>
         <p:nvSpPr>
-          <p:cNvPr id="5" name="Title 4"/>
+          <p:cNvPr id="2" name="Title 1"/>
           <p:cNvSpPr>
             <a:spLocks noGrp="1"/>
           </p:cNvSpPr>
@@ -4151,26 +4132,201 @@
           <a:bodyPr/>
           <a:lstStyle/>
           <a:p>
+            <a:r>
+              <a:rPr lang="en-US" dirty="0" smtClean="0"/>
+              <a:t>Table to </a:t>
+            </a:r>
+            <a:r>
+              <a:rPr lang="en-US" dirty="0" err="1" smtClean="0"/>
+              <a:t>DataSet</a:t>
+            </a:r>
             <a:endParaRPr lang="en-US" dirty="0"/>
           </a:p>
         </p:txBody>
       </p:sp>
       <p:sp>
         <p:nvSpPr>
-          <p:cNvPr id="6" name="Text Placeholder 5"/>
-          <p:cNvSpPr>
-            <a:spLocks noGrp="1"/>
-          </p:cNvSpPr>
-          <p:nvPr>
-            <p:ph type="body" idx="1"/>
-          </p:nvPr>
-        </p:nvSpPr>
-        <p:spPr/>
-        <p:txBody>
-          <a:bodyPr/>
+          <p:cNvPr id="3" name="Content Placeholder 2"/>
+          <p:cNvSpPr>
+            <a:spLocks noGrp="1"/>
+          </p:cNvSpPr>
+          <p:nvPr>
+            <p:ph idx="1"/>
+          </p:nvPr>
+        </p:nvSpPr>
+        <p:spPr>
+          <a:xfrm>
+            <a:off x="457200" y="1474376"/>
+            <a:ext cx="8380310" cy="4881974"/>
+          </a:xfrm>
+        </p:spPr>
+        <p:txBody>
+          <a:bodyPr>
+            <a:normAutofit/>
+          </a:bodyPr>
           <a:lstStyle/>
           <a:p>
-            <a:endParaRPr lang="en-US"/>
+            <a:pPr marL="0" indent="0">
+              <a:buNone/>
+            </a:pPr>
+            <a:r>
+              <a:rPr lang="en-US" dirty="0" smtClean="0"/>
+              <a:t>Java </a:t>
+            </a:r>
+            <a:r>
+              <a:rPr lang="en-US" dirty="0" err="1" smtClean="0"/>
+              <a:t>DataSet</a:t>
+            </a:r>
+            <a:r>
+              <a:rPr lang="en-US" dirty="0" smtClean="0"/>
+              <a:t> API via </a:t>
+            </a:r>
+            <a:r>
+              <a:rPr lang="en-US" dirty="0" err="1" smtClean="0"/>
+              <a:t>TableEnvironment</a:t>
+            </a:r>
+            <a:endParaRPr lang="en-US" dirty="0"/>
+          </a:p>
+          <a:p>
+            <a:r>
+              <a:rPr lang="en-US" dirty="0" smtClean="0"/>
+              <a:t>Convert to </a:t>
+            </a:r>
+            <a:r>
+              <a:rPr lang="en-US" dirty="0" err="1" smtClean="0"/>
+              <a:t>DataSet</a:t>
+            </a:r>
+            <a:r>
+              <a:rPr lang="en-US" dirty="0" smtClean="0"/>
+              <a:t>&lt;Row&gt;</a:t>
+            </a:r>
+          </a:p>
+          <a:p>
+            <a:r>
+              <a:rPr lang="en-US" dirty="0" smtClean="0"/>
+              <a:t>Most valuable for printing</a:t>
+            </a:r>
+          </a:p>
+          <a:p>
+            <a:pPr marL="0" indent="0">
+              <a:buNone/>
+            </a:pPr>
+            <a:endParaRPr lang="en-US" sz="2600" dirty="0" smtClean="0"/>
+          </a:p>
+          <a:p>
+            <a:pPr marL="0" indent="0">
+              <a:buNone/>
+            </a:pPr>
+            <a:r>
+              <a:rPr lang="en-US" sz="2200" dirty="0" smtClean="0">
+                <a:latin typeface="Menlo Regular"/>
+                <a:cs typeface="Menlo Regular"/>
+              </a:rPr>
+              <a:t>Table t = </a:t>
+            </a:r>
+            <a:r>
+              <a:rPr lang="en-US" sz="2200" dirty="0" err="1" smtClean="0">
+                <a:latin typeface="Menlo Regular"/>
+                <a:cs typeface="Menlo Regular"/>
+              </a:rPr>
+              <a:t>x.as</a:t>
+            </a:r>
+            <a:r>
+              <a:rPr lang="en-US" sz="2200" dirty="0" smtClean="0">
+                <a:latin typeface="Menlo Regular"/>
+                <a:cs typeface="Menlo Regular"/>
+              </a:rPr>
+              <a:t>(“name, count, price”);</a:t>
+            </a:r>
+          </a:p>
+          <a:p>
+            <a:pPr marL="0" indent="0">
+              <a:buNone/>
+            </a:pPr>
+            <a:r>
+              <a:rPr lang="en-US" sz="2200" dirty="0" err="1">
+                <a:latin typeface="Menlo Regular"/>
+                <a:cs typeface="Menlo Regular"/>
+              </a:rPr>
+              <a:t>TableEnvironment</a:t>
+            </a:r>
+            <a:r>
+              <a:rPr lang="en-US" sz="2200" dirty="0">
+                <a:latin typeface="Menlo Regular"/>
+                <a:cs typeface="Menlo Regular"/>
+              </a:rPr>
+              <a:t> </a:t>
+            </a:r>
+            <a:r>
+              <a:rPr lang="en-US" sz="2200" dirty="0" err="1">
+                <a:latin typeface="Menlo Regular"/>
+                <a:cs typeface="Menlo Regular"/>
+              </a:rPr>
+              <a:t>tEnv</a:t>
+            </a:r>
+            <a:r>
+              <a:rPr lang="en-US" sz="2200" dirty="0">
+                <a:latin typeface="Menlo Regular"/>
+                <a:cs typeface="Menlo Regular"/>
+              </a:rPr>
+              <a:t> = new </a:t>
+            </a:r>
+            <a:r>
+              <a:rPr lang="en-US" sz="2200" dirty="0" err="1">
+                <a:latin typeface="Menlo Regular"/>
+                <a:cs typeface="Menlo Regular"/>
+              </a:rPr>
+              <a:t>TableEnvironment</a:t>
+            </a:r>
+            <a:r>
+              <a:rPr lang="en-US" sz="2200" dirty="0">
+                <a:latin typeface="Menlo Regular"/>
+                <a:cs typeface="Menlo Regular"/>
+              </a:rPr>
+              <a:t>();</a:t>
+            </a:r>
+          </a:p>
+          <a:p>
+            <a:pPr marL="0" indent="0">
+              <a:buNone/>
+            </a:pPr>
+            <a:r>
+              <a:rPr lang="en-US" sz="2200" dirty="0" err="1" smtClean="0">
+                <a:latin typeface="Menlo Regular"/>
+                <a:cs typeface="Menlo Regular"/>
+              </a:rPr>
+              <a:t>tEnv.toDataSet</a:t>
+            </a:r>
+            <a:r>
+              <a:rPr lang="en-US" sz="2200" dirty="0" smtClean="0">
+                <a:latin typeface="Menlo Regular"/>
+                <a:cs typeface="Menlo Regular"/>
+              </a:rPr>
+              <a:t>(t, </a:t>
+            </a:r>
+            <a:r>
+              <a:rPr lang="en-US" sz="2200" dirty="0" err="1" smtClean="0">
+                <a:latin typeface="Menlo Regular"/>
+                <a:cs typeface="Menlo Regular"/>
+              </a:rPr>
+              <a:t>Row.class</a:t>
+            </a:r>
+            <a:r>
+              <a:rPr lang="en-US" sz="2200" dirty="0" smtClean="0">
+                <a:latin typeface="Menlo Regular"/>
+                <a:cs typeface="Menlo Regular"/>
+              </a:rPr>
+              <a:t>).print();</a:t>
+            </a:r>
+          </a:p>
+          <a:p>
+            <a:pPr marL="0" indent="0">
+              <a:buNone/>
+            </a:pPr>
+            <a:endParaRPr lang="en-US" sz="2000" dirty="0">
+              <a:latin typeface="Menlo Regular"/>
+              <a:cs typeface="Menlo Regular"/>
+            </a:endParaRPr>
           </a:p>
         </p:txBody>
       </p:sp>
@@ -4199,6 +4355,110 @@
               </a:rPr>
               <a:pPr/>
               <a:t>10</a:t>
+            </a:fld>
+            <a:endParaRPr lang="en-US">
+              <a:solidFill>
+                <a:prstClr val="black">
+                  <a:tint val="75000"/>
+                </a:prstClr>
+              </a:solidFill>
+            </a:endParaRPr>
+          </a:p>
+        </p:txBody>
+      </p:sp>
+    </p:spTree>
+    <p:extLst>
+      <p:ext uri="{BB962C8B-B14F-4D97-AF65-F5344CB8AC3E}">
+        <p14:creationId xmlns:p14="http://schemas.microsoft.com/office/powerpoint/2010/main" val="1002752682"/>
+      </p:ext>
+    </p:extLst>
+  </p:cSld>
+  <p:clrMapOvr>
+    <a:masterClrMapping/>
+  </p:clrMapOvr>
+</p:sld>
+</file>
+
+<file path=ppt/slides/slide11.xml><?xml version="1.0" encoding="utf-8"?>
+<p:sld xmlns:a="http://schemas.openxmlformats.org/drawingml/2006/main" xmlns:r="http://schemas.openxmlformats.org/officeDocument/2006/relationships" xmlns:p="http://schemas.openxmlformats.org/presentationml/2006/main">
+  <p:cSld>
+    <p:spTree>
+      <p:nvGrpSpPr>
+        <p:cNvPr id="1" name=""/>
+        <p:cNvGrpSpPr/>
+        <p:nvPr/>
+      </p:nvGrpSpPr>
+      <p:grpSpPr>
+        <a:xfrm>
+          <a:off x="0" y="0"/>
+          <a:ext cx="0" cy="0"/>
+          <a:chOff x="0" y="0"/>
+          <a:chExt cx="0" cy="0"/>
+        </a:xfrm>
+      </p:grpSpPr>
+      <p:sp>
+        <p:nvSpPr>
+          <p:cNvPr id="5" name="Title 4"/>
+          <p:cNvSpPr>
+            <a:spLocks noGrp="1"/>
+          </p:cNvSpPr>
+          <p:nvPr>
+            <p:ph type="title"/>
+          </p:nvPr>
+        </p:nvSpPr>
+        <p:spPr/>
+        <p:txBody>
+          <a:bodyPr/>
+          <a:lstStyle/>
+          <a:p>
+            <a:endParaRPr lang="en-US" dirty="0"/>
+          </a:p>
+        </p:txBody>
+      </p:sp>
+      <p:sp>
+        <p:nvSpPr>
+          <p:cNvPr id="6" name="Text Placeholder 5"/>
+          <p:cNvSpPr>
+            <a:spLocks noGrp="1"/>
+          </p:cNvSpPr>
+          <p:nvPr>
+            <p:ph type="body" idx="1"/>
+          </p:nvPr>
+        </p:nvSpPr>
+        <p:spPr/>
+        <p:txBody>
+          <a:bodyPr/>
+          <a:lstStyle/>
+          <a:p>
+            <a:endParaRPr lang="en-US"/>
+          </a:p>
+        </p:txBody>
+      </p:sp>
+      <p:sp>
+        <p:nvSpPr>
+          <p:cNvPr id="4" name="Slide Number Placeholder 3"/>
+          <p:cNvSpPr>
+            <a:spLocks noGrp="1"/>
+          </p:cNvSpPr>
+          <p:nvPr>
+            <p:ph type="sldNum" sz="quarter" idx="12"/>
+          </p:nvPr>
+        </p:nvSpPr>
+        <p:spPr/>
+        <p:txBody>
+          <a:bodyPr/>
+          <a:lstStyle/>
+          <a:p>
+            <a:fld id="{B07C5D84-2227-C144-B485-A8CA33CE4230}" type="slidenum">
+              <a:rPr lang="en-US" smtClean="0">
+                <a:solidFill>
+                  <a:prstClr val="black">
+                    <a:tint val="75000"/>
+                  </a:prstClr>
+                </a:solidFill>
+              </a:rPr>
+              <a:pPr/>
+              <a:t>11</a:t>
             </a:fld>
             <a:endParaRPr lang="en-US">
               <a:solidFill>
@@ -4530,11 +4790,7 @@
           <a:p>
             <a:r>
               <a:rPr lang="en-US" dirty="0" smtClean="0"/>
-              <a:t>Makes analysis of structured data very </a:t>
-            </a:r>
-            <a:r>
-              <a:rPr lang="en-US" dirty="0" smtClean="0"/>
-              <a:t>easy</a:t>
+              <a:t>Makes analysis of structured data very easy</a:t>
             </a:r>
           </a:p>
           <a:p>
@@ -4543,7 +4799,6 @@
               <a:rPr lang="en-US" dirty="0" smtClean="0"/>
               <a:t>Think of database tables (CREATE TABLE)</a:t>
             </a:r>
-            <a:endParaRPr lang="en-US" dirty="0" smtClean="0"/>
           </a:p>
           <a:p>
             <a:endParaRPr lang="en-US" dirty="0" smtClean="0"/>
@@ -4810,7 +5065,7 @@
           <a:p>
             <a:r>
               <a:rPr lang="en-US" dirty="0" smtClean="0"/>
-              <a:t>Table API Expressions</a:t>
+              <a:t>Table API Dependency</a:t>
             </a:r>
             <a:endParaRPr lang="en-US" dirty="0"/>
           </a:p>
@@ -4826,103 +5081,104 @@
             <p:ph idx="1"/>
           </p:nvPr>
         </p:nvSpPr>
-        <p:spPr>
-          <a:xfrm>
-            <a:off x="457200" y="1474375"/>
-            <a:ext cx="8229600" cy="5247099"/>
-          </a:xfrm>
-        </p:spPr>
+        <p:spPr/>
         <p:txBody>
           <a:bodyPr>
-            <a:normAutofit fontScale="70000" lnSpcReduction="20000"/>
+            <a:normAutofit/>
           </a:bodyPr>
           <a:lstStyle/>
           <a:p>
             <a:r>
-              <a:rPr lang="en-US" dirty="0" smtClean="0">
-                <a:latin typeface="Menlo Regular"/>
-                <a:cs typeface="Menlo Regular"/>
-              </a:rPr>
-              <a:t>Table t = </a:t>
-            </a:r>
-            <a:r>
-              <a:rPr lang="en-US" dirty="0" err="1" smtClean="0">
-                <a:latin typeface="Menlo Regular"/>
-                <a:cs typeface="Menlo Regular"/>
-              </a:rPr>
-              <a:t>orig.as</a:t>
-            </a:r>
-            <a:r>
-              <a:rPr lang="en-US" dirty="0" smtClean="0">
-                <a:latin typeface="Menlo Regular"/>
-                <a:cs typeface="Menlo Regular"/>
-              </a:rPr>
-              <a:t>(“author, title, pages“);</a:t>
-            </a:r>
+              <a:rPr lang="en-US" sz="2800" dirty="0" smtClean="0"/>
+              <a:t>In order to use the Table API in your program, add this to the &lt;dependencies&gt; section of your </a:t>
+            </a:r>
+            <a:r>
+              <a:rPr lang="en-US" sz="2800" dirty="0" err="1" smtClean="0"/>
+              <a:t>pom.xml</a:t>
+            </a:r>
+            <a:endParaRPr lang="en-US" sz="2800" dirty="0"/>
+          </a:p>
+          <a:p>
+            <a:endParaRPr lang="en-US" dirty="0"/>
           </a:p>
           <a:p>
             <a:pPr marL="0" indent="0">
               <a:buNone/>
             </a:pPr>
-            <a:endParaRPr lang="en-US" dirty="0" smtClean="0">
-              <a:latin typeface="Menlo Regular"/>
-              <a:cs typeface="Menlo Regular"/>
-            </a:endParaRPr>
+            <a:r>
+              <a:rPr lang="en-US" sz="2600" dirty="0">
+                <a:latin typeface="Menlo Regular"/>
+                <a:cs typeface="Menlo Regular"/>
+              </a:rPr>
+              <a:t>&lt;dependency</a:t>
+            </a:r>
+            <a:r>
+              <a:rPr lang="en-US" sz="2600" dirty="0" smtClean="0">
+                <a:latin typeface="Menlo Regular"/>
+                <a:cs typeface="Menlo Regular"/>
+              </a:rPr>
+              <a:t>&gt;</a:t>
+            </a:r>
           </a:p>
           <a:p>
             <a:pPr marL="0" indent="0">
               <a:buNone/>
             </a:pPr>
             <a:r>
-              <a:rPr lang="en-US" dirty="0" smtClean="0">
-                <a:solidFill>
-                  <a:schemeClr val="bg1">
-                    <a:lumMod val="50000"/>
-                  </a:schemeClr>
-                </a:solidFill>
-                <a:latin typeface="Menlo Regular"/>
-                <a:cs typeface="Menlo Regular"/>
-              </a:rPr>
-              <a:t>  // filter table</a:t>
-            </a:r>
-            <a:endParaRPr lang="en-US" dirty="0">
-              <a:solidFill>
-                <a:schemeClr val="bg1">
-                  <a:lumMod val="50000"/>
-                </a:schemeClr>
-              </a:solidFill>
-              <a:latin typeface="Menlo Regular"/>
-              <a:cs typeface="Menlo Regular"/>
-            </a:endParaRPr>
-          </a:p>
-          <a:p>
-            <a:r>
-              <a:rPr lang="en-US" dirty="0" smtClean="0">
-                <a:latin typeface="Menlo Regular"/>
-                <a:cs typeface="Menlo Regular"/>
-              </a:rPr>
-              <a:t>Table t2 = </a:t>
-            </a:r>
-            <a:r>
-              <a:rPr lang="en-US" dirty="0" err="1">
-                <a:latin typeface="Menlo Regular"/>
-                <a:cs typeface="Menlo Regular"/>
-              </a:rPr>
-              <a:t>t</a:t>
-            </a:r>
-            <a:r>
-              <a:rPr lang="en-US" dirty="0" err="1" smtClean="0">
-                <a:latin typeface="Menlo Regular"/>
-                <a:cs typeface="Menlo Regular"/>
-              </a:rPr>
-              <a:t>.filter</a:t>
-            </a:r>
-            <a:r>
-              <a:rPr lang="en-US" dirty="0" smtClean="0">
-                <a:latin typeface="Menlo Regular"/>
-                <a:cs typeface="Menlo Regular"/>
-              </a:rPr>
-              <a:t>(“pages &gt; 100”);</a:t>
+              <a:rPr lang="en-US" sz="2600" dirty="0">
+                <a:latin typeface="Menlo Regular"/>
+                <a:cs typeface="Menlo Regular"/>
+              </a:rPr>
+              <a:t> </a:t>
+            </a:r>
+            <a:r>
+              <a:rPr lang="en-US" sz="2600" dirty="0" smtClean="0">
+                <a:latin typeface="Menlo Regular"/>
+                <a:cs typeface="Menlo Regular"/>
+              </a:rPr>
+              <a:t> &lt;</a:t>
+            </a:r>
+            <a:r>
+              <a:rPr lang="en-US" sz="2600" dirty="0" err="1">
+                <a:latin typeface="Menlo Regular"/>
+                <a:cs typeface="Menlo Regular"/>
+              </a:rPr>
+              <a:t>groupId</a:t>
+            </a:r>
+            <a:r>
+              <a:rPr lang="en-US" sz="2600" dirty="0">
+                <a:latin typeface="Menlo Regular"/>
+                <a:cs typeface="Menlo Regular"/>
+              </a:rPr>
+              <a:t>&gt;</a:t>
+            </a:r>
+            <a:r>
+              <a:rPr lang="en-US" sz="2600" dirty="0" err="1">
+                <a:latin typeface="Menlo Regular"/>
+                <a:cs typeface="Menlo Regular"/>
+              </a:rPr>
+              <a:t>org.apache.flink</a:t>
+            </a:r>
+            <a:r>
+              <a:rPr lang="en-US" sz="2600" dirty="0">
+                <a:latin typeface="Menlo Regular"/>
+                <a:cs typeface="Menlo Regular"/>
+              </a:rPr>
+              <a:t>&lt;/</a:t>
+            </a:r>
+            <a:r>
+              <a:rPr lang="en-US" sz="2600" dirty="0" err="1">
+                <a:latin typeface="Menlo Regular"/>
+                <a:cs typeface="Menlo Regular"/>
+              </a:rPr>
+              <a:t>groupId</a:t>
+            </a:r>
+            <a:r>
+              <a:rPr lang="en-US" sz="2600" dirty="0" smtClean="0">
+                <a:latin typeface="Menlo Regular"/>
+                <a:cs typeface="Menlo Regular"/>
+              </a:rPr>
+              <a:t>&gt;</a:t>
             </a:r>
           </a:p>
           <a:p>
@@ -4930,74 +5186,60 @@
               <a:buNone/>
             </a:pPr>
             <a:r>
-              <a:rPr lang="en-US" dirty="0" smtClean="0">
-                <a:solidFill>
-                  <a:srgbClr val="7F7F7F"/>
-                </a:solidFill>
-                <a:latin typeface="Menlo Regular"/>
-                <a:cs typeface="Menlo Regular"/>
-              </a:rPr>
-              <a:t>  // project table</a:t>
-            </a:r>
-          </a:p>
-          <a:p>
-            <a:r>
-              <a:rPr lang="en-US" dirty="0" smtClean="0">
-                <a:latin typeface="Menlo Regular"/>
-                <a:cs typeface="Menlo Regular"/>
-              </a:rPr>
-              <a:t>Table t3 = </a:t>
-            </a:r>
-            <a:r>
-              <a:rPr lang="en-US" dirty="0" err="1" smtClean="0">
-                <a:latin typeface="Menlo Regular"/>
-                <a:cs typeface="Menlo Regular"/>
-              </a:rPr>
-              <a:t>t.select</a:t>
-            </a:r>
-            <a:r>
-              <a:rPr lang="en-US" dirty="0" smtClean="0">
-                <a:latin typeface="Menlo Regular"/>
-                <a:cs typeface="Menlo Regular"/>
-              </a:rPr>
-              <a:t>(“author, title”);</a:t>
-            </a:r>
-          </a:p>
-          <a:p>
-            <a:r>
-              <a:rPr lang="en-US" dirty="0" smtClean="0">
-                <a:latin typeface="Menlo Regular"/>
-                <a:cs typeface="Menlo Regular"/>
-              </a:rPr>
-              <a:t>Table t4 = </a:t>
-            </a:r>
-            <a:r>
-              <a:rPr lang="en-US" dirty="0" err="1" smtClean="0">
-                <a:latin typeface="Menlo Regular"/>
-                <a:cs typeface="Menlo Regular"/>
-              </a:rPr>
-              <a:t>t.select</a:t>
-            </a:r>
-            <a:r>
-              <a:rPr lang="en-US" dirty="0" smtClean="0">
-                <a:latin typeface="Menlo Regular"/>
-                <a:cs typeface="Menlo Regular"/>
-              </a:rPr>
-              <a:t>(“pages*2 as </a:t>
-            </a:r>
-            <a:r>
-              <a:rPr lang="en-US" dirty="0" err="1" smtClean="0">
-                <a:latin typeface="Menlo Regular"/>
-                <a:cs typeface="Menlo Regular"/>
-              </a:rPr>
-              <a:t>dPages</a:t>
-            </a:r>
-            <a:r>
-              <a:rPr lang="en-US" dirty="0" smtClean="0">
-                <a:latin typeface="Menlo Regular"/>
-                <a:cs typeface="Menlo Regular"/>
-              </a:rPr>
-              <a:t>”);</a:t>
+              <a:rPr lang="en-US" sz="2600" dirty="0">
+                <a:latin typeface="Menlo Regular"/>
+                <a:cs typeface="Menlo Regular"/>
+              </a:rPr>
+              <a:t> </a:t>
+            </a:r>
+            <a:r>
+              <a:rPr lang="en-US" sz="2600" dirty="0" smtClean="0">
+                <a:latin typeface="Menlo Regular"/>
+                <a:cs typeface="Menlo Regular"/>
+              </a:rPr>
+              <a:t> &lt;</a:t>
+            </a:r>
+            <a:r>
+              <a:rPr lang="en-US" sz="2600" dirty="0" err="1">
+                <a:latin typeface="Menlo Regular"/>
+                <a:cs typeface="Menlo Regular"/>
+              </a:rPr>
+              <a:t>artifactId</a:t>
+            </a:r>
+            <a:r>
+              <a:rPr lang="en-US" sz="2600" dirty="0">
+                <a:latin typeface="Menlo Regular"/>
+                <a:cs typeface="Menlo Regular"/>
+              </a:rPr>
+              <a:t>&gt;</a:t>
+            </a:r>
+            <a:r>
+              <a:rPr lang="en-US" sz="2600" dirty="0" err="1">
+                <a:latin typeface="Menlo Regular"/>
+                <a:cs typeface="Menlo Regular"/>
+              </a:rPr>
+              <a:t>flink</a:t>
+            </a:r>
+            <a:r>
+              <a:rPr lang="en-US" sz="2600" dirty="0">
+                <a:latin typeface="Menlo Regular"/>
+                <a:cs typeface="Menlo Regular"/>
+              </a:rPr>
+              <a:t>-table&lt;/</a:t>
+            </a:r>
+            <a:r>
+              <a:rPr lang="en-US" sz="2600" dirty="0" err="1">
+                <a:latin typeface="Menlo Regular"/>
+                <a:cs typeface="Menlo Regular"/>
+              </a:rPr>
+              <a:t>artifactId</a:t>
+            </a:r>
+            <a:r>
+              <a:rPr lang="en-US" sz="2600" dirty="0" smtClean="0">
+                <a:latin typeface="Menlo Regular"/>
+                <a:cs typeface="Menlo Regular"/>
+              </a:rPr>
+              <a:t>&gt;</a:t>
             </a:r>
           </a:p>
           <a:p>
@@ -5005,92 +5247,32 @@
               <a:buNone/>
             </a:pPr>
             <a:r>
-              <a:rPr lang="en-US" dirty="0" smtClean="0">
-                <a:solidFill>
-                  <a:srgbClr val="7F7F7F"/>
-                </a:solidFill>
-                <a:latin typeface="Menlo Regular"/>
-                <a:cs typeface="Menlo Regular"/>
-              </a:rPr>
-              <a:t>  // group table and compute aggregations</a:t>
-            </a:r>
-          </a:p>
-          <a:p>
-            <a:r>
-              <a:rPr lang="en-US" dirty="0" smtClean="0">
-                <a:latin typeface="Menlo Regular"/>
-                <a:cs typeface="Menlo Regular"/>
-              </a:rPr>
-              <a:t>Table t5 = </a:t>
-            </a:r>
-            <a:r>
-              <a:rPr lang="en-US" dirty="0" err="1" smtClean="0">
-                <a:latin typeface="Menlo Regular"/>
-                <a:cs typeface="Menlo Regular"/>
-              </a:rPr>
-              <a:t>t.groupBy</a:t>
-            </a:r>
-            <a:r>
-              <a:rPr lang="en-US" dirty="0" smtClean="0">
-                <a:latin typeface="Menlo Regular"/>
-                <a:cs typeface="Menlo Regular"/>
-              </a:rPr>
-              <a:t>(“author”)</a:t>
-            </a:r>
-            <a:br>
-              <a:rPr lang="en-US" dirty="0" smtClean="0">
-                <a:latin typeface="Menlo Regular"/>
-                <a:cs typeface="Menlo Regular"/>
-              </a:rPr>
-            </a:br>
-            <a:r>
-              <a:rPr lang="en-US" dirty="0" smtClean="0">
-                <a:latin typeface="Menlo Regular"/>
-                <a:cs typeface="Menlo Regular"/>
-              </a:rPr>
-              <a:t>           </a:t>
-            </a:r>
-            <a:r>
-              <a:rPr lang="en-US" dirty="0">
+              <a:rPr lang="en-US" sz="2600" dirty="0">
                 <a:latin typeface="Menlo Regular"/>
                 <a:cs typeface="Menlo Regular"/>
               </a:rPr>
               <a:t> </a:t>
             </a:r>
             <a:r>
-              <a:rPr lang="en-US" dirty="0" smtClean="0">
-                <a:latin typeface="Menlo Regular"/>
-                <a:cs typeface="Menlo Regular"/>
-              </a:rPr>
-              <a:t>.select(“</a:t>
-            </a:r>
-            <a:r>
-              <a:rPr lang="en-US" dirty="0" err="1" smtClean="0">
-                <a:latin typeface="Menlo Regular"/>
-                <a:cs typeface="Menlo Regular"/>
-              </a:rPr>
-              <a:t>pages.avg</a:t>
-            </a:r>
-            <a:r>
-              <a:rPr lang="en-US" dirty="0" smtClean="0">
-                <a:latin typeface="Menlo Regular"/>
-                <a:cs typeface="Menlo Regular"/>
-              </a:rPr>
-              <a:t> as </a:t>
-            </a:r>
-            <a:r>
-              <a:rPr lang="en-US" dirty="0" err="1" smtClean="0">
-                <a:latin typeface="Menlo Regular"/>
-                <a:cs typeface="Menlo Regular"/>
-              </a:rPr>
-              <a:t>avgPages</a:t>
-            </a:r>
-            <a:r>
-              <a:rPr lang="en-US" dirty="0" smtClean="0">
-                <a:latin typeface="Menlo Regular"/>
-                <a:cs typeface="Menlo Regular"/>
-              </a:rPr>
-              <a:t>”);</a:t>
+              <a:rPr lang="en-US" sz="2600" dirty="0" smtClean="0">
+                <a:latin typeface="Menlo Regular"/>
+                <a:cs typeface="Menlo Regular"/>
+              </a:rPr>
+              <a:t> &lt;</a:t>
+            </a:r>
+            <a:r>
+              <a:rPr lang="en-US" sz="2600" dirty="0">
+                <a:latin typeface="Menlo Regular"/>
+                <a:cs typeface="Menlo Regular"/>
+              </a:rPr>
+              <a:t>version&gt;0.9-SNAPSHOT&lt;/version</a:t>
+            </a:r>
+            <a:r>
+              <a:rPr lang="en-US" sz="2600" dirty="0" smtClean="0">
+                <a:latin typeface="Menlo Regular"/>
+                <a:cs typeface="Menlo Regular"/>
+              </a:rPr>
+              <a:t>&gt;</a:t>
             </a:r>
           </a:p>
           <a:p>
@@ -5098,83 +5280,24 @@
               <a:buNone/>
             </a:pPr>
             <a:r>
-              <a:rPr lang="en-US" dirty="0" smtClean="0">
-                <a:solidFill>
-                  <a:srgbClr val="7F7F7F"/>
-                </a:solidFill>
-                <a:latin typeface="Menlo Regular"/>
-                <a:cs typeface="Menlo Regular"/>
-              </a:rPr>
-              <a:t>  // join two table</a:t>
-            </a:r>
-          </a:p>
-          <a:p>
-            <a:r>
-              <a:rPr lang="en-US" dirty="0" smtClean="0">
-                <a:latin typeface="Menlo Regular"/>
-                <a:cs typeface="Menlo Regular"/>
-              </a:rPr>
-              <a:t>Table t6 = </a:t>
-            </a:r>
-            <a:r>
-              <a:rPr lang="en-US" dirty="0" err="1" smtClean="0">
-                <a:latin typeface="Menlo Regular"/>
-                <a:cs typeface="Menlo Regular"/>
-              </a:rPr>
-              <a:t>t.join</a:t>
-            </a:r>
-            <a:r>
-              <a:rPr lang="en-US" dirty="0" smtClean="0">
-                <a:latin typeface="Menlo Regular"/>
-                <a:cs typeface="Menlo Regular"/>
-              </a:rPr>
-              <a:t>(</a:t>
-            </a:r>
-            <a:r>
-              <a:rPr lang="en-US" dirty="0" err="1" smtClean="0">
-                <a:latin typeface="Menlo Regular"/>
-                <a:cs typeface="Menlo Regular"/>
-              </a:rPr>
-              <a:t>t.select</a:t>
-            </a:r>
-            <a:r>
-              <a:rPr lang="en-US" dirty="0" smtClean="0">
-                <a:latin typeface="Menlo Regular"/>
-                <a:cs typeface="Menlo Regular"/>
-              </a:rPr>
-              <a:t>(“author2,title2”))</a:t>
-            </a:r>
-            <a:br>
-              <a:rPr lang="en-US" dirty="0" smtClean="0">
-                <a:latin typeface="Menlo Regular"/>
-                <a:cs typeface="Menlo Regular"/>
-              </a:rPr>
-            </a:br>
-            <a:r>
-              <a:rPr lang="en-US" dirty="0" smtClean="0">
-                <a:latin typeface="Menlo Regular"/>
-                <a:cs typeface="Menlo Regular"/>
-              </a:rPr>
-              <a:t>            .where(“author = author2”)</a:t>
-            </a:r>
-            <a:br>
-              <a:rPr lang="en-US" dirty="0" smtClean="0">
-                <a:latin typeface="Menlo Regular"/>
-                <a:cs typeface="Menlo Regular"/>
-              </a:rPr>
-            </a:br>
-            <a:r>
-              <a:rPr lang="en-US" dirty="0" smtClean="0">
-                <a:latin typeface="Menlo Regular"/>
-                <a:cs typeface="Menlo Regular"/>
-              </a:rPr>
-              <a:t>            .select(“title, title2”);</a:t>
-            </a:r>
-          </a:p>
-          <a:p>
-            <a:endParaRPr lang="en-US" dirty="0" smtClean="0"/>
-          </a:p>
-          <a:p>
+              <a:rPr lang="en-US" sz="2600" dirty="0" smtClean="0">
+                <a:latin typeface="Menlo Regular"/>
+                <a:cs typeface="Menlo Regular"/>
+              </a:rPr>
+              <a:t>&lt;</a:t>
+            </a:r>
+            <a:r>
+              <a:rPr lang="en-US" sz="2600" dirty="0">
+                <a:latin typeface="Menlo Regular"/>
+                <a:cs typeface="Menlo Regular"/>
+              </a:rPr>
+              <a:t>/dependency&gt;</a:t>
+            </a:r>
+          </a:p>
+          <a:p>
+            <a:pPr marL="0" indent="0">
+              <a:buNone/>
+            </a:pPr>
             <a:endParaRPr lang="en-US" dirty="0"/>
           </a:p>
         </p:txBody>
@@ -5218,7 +5341,7 @@
     </p:spTree>
     <p:extLst>
       <p:ext uri="{BB962C8B-B14F-4D97-AF65-F5344CB8AC3E}">
-        <p14:creationId xmlns:p14="http://schemas.microsoft.com/office/powerpoint/2010/main" val="506144847"/>
+        <p14:creationId xmlns:p14="http://schemas.microsoft.com/office/powerpoint/2010/main" val="3386741345"/>
       </p:ext>
     </p:extLst>
   </p:cSld>
@@ -5261,12 +5384,8 @@
           <a:lstStyle/>
           <a:p>
             <a:r>
-              <a:rPr lang="en-US" dirty="0" err="1" smtClean="0"/>
-              <a:t>DataSet</a:t>
-            </a:r>
-            <a:r>
               <a:rPr lang="en-US" dirty="0" smtClean="0"/>
-              <a:t> to Table</a:t>
+              <a:t>Table API Expressions</a:t>
             </a:r>
             <a:endParaRPr lang="en-US" dirty="0"/>
           </a:p>
@@ -5282,100 +5401,45 @@
             <p:ph idx="1"/>
           </p:nvPr>
         </p:nvSpPr>
-        <p:spPr/>
+        <p:spPr>
+          <a:xfrm>
+            <a:off x="457200" y="1474375"/>
+            <a:ext cx="8229600" cy="5247099"/>
+          </a:xfrm>
+        </p:spPr>
         <p:txBody>
           <a:bodyPr>
-            <a:normAutofit/>
+            <a:normAutofit fontScale="70000" lnSpcReduction="20000"/>
           </a:bodyPr>
           <a:lstStyle/>
           <a:p>
+            <a:r>
+              <a:rPr lang="en-US" dirty="0" smtClean="0">
+                <a:latin typeface="Menlo Regular"/>
+                <a:cs typeface="Menlo Regular"/>
+              </a:rPr>
+              <a:t>Table t = </a:t>
+            </a:r>
+            <a:r>
+              <a:rPr lang="en-US" dirty="0" err="1" smtClean="0">
+                <a:latin typeface="Menlo Regular"/>
+                <a:cs typeface="Menlo Regular"/>
+              </a:rPr>
+              <a:t>orig.as</a:t>
+            </a:r>
+            <a:r>
+              <a:rPr lang="en-US" dirty="0" smtClean="0">
+                <a:latin typeface="Menlo Regular"/>
+                <a:cs typeface="Menlo Regular"/>
+              </a:rPr>
+              <a:t>(“author, title, pages“);</a:t>
+            </a:r>
+          </a:p>
+          <a:p>
             <a:pPr marL="0" indent="0">
               <a:buNone/>
             </a:pPr>
-            <a:r>
-              <a:rPr lang="en-US" dirty="0" smtClean="0"/>
-              <a:t>Java </a:t>
-            </a:r>
-            <a:r>
-              <a:rPr lang="en-US" dirty="0" err="1" smtClean="0"/>
-              <a:t>DataSet</a:t>
-            </a:r>
-            <a:r>
-              <a:rPr lang="en-US" dirty="0" smtClean="0"/>
-              <a:t> API via </a:t>
-            </a:r>
-            <a:r>
-              <a:rPr lang="en-US" dirty="0" err="1" smtClean="0"/>
-              <a:t>TableEnvironment</a:t>
-            </a:r>
-            <a:r>
-              <a:rPr lang="en-US" dirty="0" smtClean="0"/>
-              <a:t>:</a:t>
-            </a:r>
-          </a:p>
-          <a:p>
-            <a:pPr marL="0" indent="0">
-              <a:buNone/>
-            </a:pPr>
-            <a:endParaRPr lang="en-US" sz="1800" dirty="0" smtClean="0"/>
-          </a:p>
-          <a:p>
-            <a:pPr marL="0" indent="0">
-              <a:buNone/>
-            </a:pPr>
-            <a:r>
-              <a:rPr lang="en-US" sz="2000" dirty="0" smtClean="0">
-                <a:latin typeface="Menlo Regular"/>
-                <a:cs typeface="Menlo Regular"/>
-              </a:rPr>
-              <a:t>// data set</a:t>
-            </a:r>
-          </a:p>
-          <a:p>
-            <a:pPr marL="0" indent="0">
-              <a:buNone/>
-            </a:pPr>
-            <a:r>
-              <a:rPr lang="en-US" sz="2000" dirty="0" err="1">
-                <a:latin typeface="Menlo Regular"/>
-                <a:cs typeface="Menlo Regular"/>
-              </a:rPr>
-              <a:t>D</a:t>
-            </a:r>
-            <a:r>
-              <a:rPr lang="en-US" sz="2000" dirty="0" err="1" smtClean="0">
-                <a:latin typeface="Menlo Regular"/>
-                <a:cs typeface="Menlo Regular"/>
-              </a:rPr>
-              <a:t>ataSet</a:t>
-            </a:r>
-            <a:r>
-              <a:rPr lang="en-US" sz="2000" dirty="0" smtClean="0">
-                <a:latin typeface="Menlo Regular"/>
-                <a:cs typeface="Menlo Regular"/>
-              </a:rPr>
-              <a:t>&lt;Table3&lt;</a:t>
-            </a:r>
-            <a:r>
-              <a:rPr lang="en-US" sz="2000" dirty="0" err="1" smtClean="0">
-                <a:latin typeface="Menlo Regular"/>
-                <a:cs typeface="Menlo Regular"/>
-              </a:rPr>
-              <a:t>String,Long,Double</a:t>
-            </a:r>
-            <a:r>
-              <a:rPr lang="en-US" sz="2000" dirty="0" smtClean="0">
-                <a:latin typeface="Menlo Regular"/>
-                <a:cs typeface="Menlo Regular"/>
-              </a:rPr>
-              <a:t>&gt;&gt; ds = …;</a:t>
-            </a:r>
-          </a:p>
-          <a:p>
-            <a:pPr marL="0" indent="0">
-              <a:buNone/>
-            </a:pPr>
-            <a:endParaRPr lang="en-US" sz="2000" dirty="0" smtClean="0">
+            <a:endParaRPr lang="en-US" dirty="0" smtClean="0">
               <a:latin typeface="Menlo Regular"/>
               <a:cs typeface="Menlo Regular"/>
             </a:endParaRPr>
@@ -5385,126 +5449,308 @@
               <a:buNone/>
             </a:pPr>
             <a:r>
-              <a:rPr lang="en-US" sz="2000" dirty="0" smtClean="0">
-                <a:latin typeface="Menlo Regular"/>
-                <a:cs typeface="Menlo Regular"/>
-              </a:rPr>
-              <a:t>// get a </a:t>
-            </a:r>
-            <a:r>
-              <a:rPr lang="en-US" sz="2000" dirty="0" err="1" smtClean="0">
-                <a:latin typeface="Menlo Regular"/>
-                <a:cs typeface="Menlo Regular"/>
-              </a:rPr>
-              <a:t>TableEnvironment</a:t>
-            </a:r>
-            <a:endParaRPr lang="en-US" sz="2000" dirty="0">
+              <a:rPr lang="en-US" dirty="0" smtClean="0">
+                <a:solidFill>
+                  <a:schemeClr val="bg1">
+                    <a:lumMod val="50000"/>
+                  </a:schemeClr>
+                </a:solidFill>
+                <a:latin typeface="Menlo Regular"/>
+                <a:cs typeface="Menlo Regular"/>
+              </a:rPr>
+              <a:t>  // filter table</a:t>
+            </a:r>
+            <a:endParaRPr lang="en-US" dirty="0">
+              <a:solidFill>
+                <a:schemeClr val="bg1">
+                  <a:lumMod val="50000"/>
+                </a:schemeClr>
+              </a:solidFill>
               <a:latin typeface="Menlo Regular"/>
               <a:cs typeface="Menlo Regular"/>
             </a:endParaRPr>
           </a:p>
           <a:p>
+            <a:r>
+              <a:rPr lang="en-US" dirty="0" smtClean="0">
+                <a:latin typeface="Menlo Regular"/>
+                <a:cs typeface="Menlo Regular"/>
+              </a:rPr>
+              <a:t>Table t2 = </a:t>
+            </a:r>
+            <a:r>
+              <a:rPr lang="en-US" dirty="0" err="1">
+                <a:latin typeface="Menlo Regular"/>
+                <a:cs typeface="Menlo Regular"/>
+              </a:rPr>
+              <a:t>t</a:t>
+            </a:r>
+            <a:r>
+              <a:rPr lang="en-US" dirty="0" err="1" smtClean="0">
+                <a:latin typeface="Menlo Regular"/>
+                <a:cs typeface="Menlo Regular"/>
+              </a:rPr>
+              <a:t>.filter</a:t>
+            </a:r>
+            <a:r>
+              <a:rPr lang="en-US" dirty="0" smtClean="0">
+                <a:latin typeface="Menlo Regular"/>
+                <a:cs typeface="Menlo Regular"/>
+              </a:rPr>
+              <a:t>(“pages &gt; 100”);</a:t>
+            </a:r>
+          </a:p>
+          <a:p>
             <a:pPr marL="0" indent="0">
               <a:buNone/>
             </a:pPr>
             <a:r>
-              <a:rPr lang="en-US" sz="2000" dirty="0" err="1" smtClean="0">
-                <a:latin typeface="Menlo Regular"/>
-                <a:cs typeface="Menlo Regular"/>
-              </a:rPr>
-              <a:t>TableEnvironment</a:t>
-            </a:r>
-            <a:r>
-              <a:rPr lang="en-US" sz="2000" dirty="0" smtClean="0">
+              <a:rPr lang="en-US" dirty="0" smtClean="0">
+                <a:solidFill>
+                  <a:srgbClr val="7F7F7F"/>
+                </a:solidFill>
+                <a:latin typeface="Menlo Regular"/>
+                <a:cs typeface="Menlo Regular"/>
+              </a:rPr>
+              <a:t>  // project table</a:t>
+            </a:r>
+          </a:p>
+          <a:p>
+            <a:r>
+              <a:rPr lang="en-US" dirty="0" smtClean="0">
+                <a:latin typeface="Menlo Regular"/>
+                <a:cs typeface="Menlo Regular"/>
+              </a:rPr>
+              <a:t>Table t3 = </a:t>
+            </a:r>
+            <a:r>
+              <a:rPr lang="en-US" dirty="0" err="1" smtClean="0">
+                <a:latin typeface="Menlo Regular"/>
+                <a:cs typeface="Menlo Regular"/>
+              </a:rPr>
+              <a:t>t.select</a:t>
+            </a:r>
+            <a:r>
+              <a:rPr lang="en-US" dirty="0" smtClean="0">
+                <a:latin typeface="Menlo Regular"/>
+                <a:cs typeface="Menlo Regular"/>
+              </a:rPr>
+              <a:t>(“author, title”);</a:t>
+            </a:r>
+          </a:p>
+          <a:p>
+            <a:r>
+              <a:rPr lang="en-US" dirty="0" smtClean="0">
+                <a:latin typeface="Menlo Regular"/>
+                <a:cs typeface="Menlo Regular"/>
+              </a:rPr>
+              <a:t>Table t4 = </a:t>
+            </a:r>
+            <a:r>
+              <a:rPr lang="en-US" dirty="0" err="1" smtClean="0">
+                <a:latin typeface="Menlo Regular"/>
+                <a:cs typeface="Menlo Regular"/>
+              </a:rPr>
+              <a:t>t.select</a:t>
+            </a:r>
+            <a:r>
+              <a:rPr lang="en-US" dirty="0" smtClean="0">
+                <a:latin typeface="Menlo Regular"/>
+                <a:cs typeface="Menlo Regular"/>
+              </a:rPr>
+              <a:t>(“pages*2 as </a:t>
+            </a:r>
+            <a:r>
+              <a:rPr lang="en-US" dirty="0" err="1" smtClean="0">
+                <a:latin typeface="Menlo Regular"/>
+                <a:cs typeface="Menlo Regular"/>
+              </a:rPr>
+              <a:t>dPages</a:t>
+            </a:r>
+            <a:r>
+              <a:rPr lang="en-US" dirty="0" smtClean="0">
+                <a:latin typeface="Menlo Regular"/>
+                <a:cs typeface="Menlo Regular"/>
+              </a:rPr>
+              <a:t>”);</a:t>
+            </a:r>
+          </a:p>
+          <a:p>
+            <a:pPr marL="0" indent="0">
+              <a:buNone/>
+            </a:pPr>
+            <a:r>
+              <a:rPr lang="en-US" dirty="0" smtClean="0">
+                <a:solidFill>
+                  <a:srgbClr val="7F7F7F"/>
+                </a:solidFill>
+                <a:latin typeface="Menlo Regular"/>
+                <a:cs typeface="Menlo Regular"/>
+              </a:rPr>
+              <a:t>  // group table and compute aggregations</a:t>
+            </a:r>
+          </a:p>
+          <a:p>
+            <a:r>
+              <a:rPr lang="en-US" dirty="0" smtClean="0">
+                <a:latin typeface="Menlo Regular"/>
+                <a:cs typeface="Menlo Regular"/>
+              </a:rPr>
+              <a:t>Table t5 = </a:t>
+            </a:r>
+            <a:r>
+              <a:rPr lang="en-US" dirty="0" err="1" smtClean="0">
+                <a:latin typeface="Menlo Regular"/>
+                <a:cs typeface="Menlo Regular"/>
+              </a:rPr>
+              <a:t>t.groupBy</a:t>
+            </a:r>
+            <a:r>
+              <a:rPr lang="en-US" dirty="0" smtClean="0">
+                <a:latin typeface="Menlo Regular"/>
+                <a:cs typeface="Menlo Regular"/>
+              </a:rPr>
+              <a:t>(“author”)</a:t>
+            </a:r>
+            <a:br>
+              <a:rPr lang="en-US" dirty="0" smtClean="0">
+                <a:latin typeface="Menlo Regular"/>
+                <a:cs typeface="Menlo Regular"/>
+              </a:rPr>
+            </a:br>
+            <a:r>
+              <a:rPr lang="en-US" dirty="0" smtClean="0">
+                <a:latin typeface="Menlo Regular"/>
+                <a:cs typeface="Menlo Regular"/>
+              </a:rPr>
+              <a:t>           </a:t>
+            </a:r>
+            <a:r>
+              <a:rPr lang="en-US" dirty="0">
                 <a:latin typeface="Menlo Regular"/>
                 <a:cs typeface="Menlo Regular"/>
               </a:rPr>
               <a:t> </a:t>
             </a:r>
             <a:r>
-              <a:rPr lang="en-US" sz="2000" dirty="0" err="1" smtClean="0">
-                <a:latin typeface="Menlo Regular"/>
-                <a:cs typeface="Menlo Regular"/>
-              </a:rPr>
-              <a:t>tEnv</a:t>
-            </a:r>
-            <a:r>
-              <a:rPr lang="en-US" sz="2000" dirty="0" smtClean="0">
-                <a:latin typeface="Menlo Regular"/>
-                <a:cs typeface="Menlo Regular"/>
-              </a:rPr>
-              <a:t> = new </a:t>
-            </a:r>
-            <a:r>
-              <a:rPr lang="en-US" sz="2000" dirty="0" err="1" smtClean="0">
-                <a:latin typeface="Menlo Regular"/>
-                <a:cs typeface="Menlo Regular"/>
-              </a:rPr>
-              <a:t>TableEnvironment</a:t>
-            </a:r>
-            <a:r>
-              <a:rPr lang="en-US" sz="2000" dirty="0" smtClean="0">
-                <a:latin typeface="Menlo Regular"/>
-                <a:cs typeface="Menlo Regular"/>
-              </a:rPr>
-              <a:t>();</a:t>
+              <a:rPr lang="en-US" dirty="0" smtClean="0">
+                <a:latin typeface="Menlo Regular"/>
+                <a:cs typeface="Menlo Regular"/>
+              </a:rPr>
+              <a:t>.select(“</a:t>
+            </a:r>
+            <a:r>
+              <a:rPr lang="en-US" dirty="0" err="1" smtClean="0">
+                <a:latin typeface="Menlo Regular"/>
+                <a:cs typeface="Menlo Regular"/>
+              </a:rPr>
+              <a:t>pages.avg</a:t>
+            </a:r>
+            <a:r>
+              <a:rPr lang="en-US" dirty="0" smtClean="0">
+                <a:latin typeface="Menlo Regular"/>
+                <a:cs typeface="Menlo Regular"/>
+              </a:rPr>
+              <a:t> as </a:t>
+            </a:r>
+            <a:r>
+              <a:rPr lang="en-US" dirty="0" err="1" smtClean="0">
+                <a:latin typeface="Menlo Regular"/>
+                <a:cs typeface="Menlo Regular"/>
+              </a:rPr>
+              <a:t>avgPages</a:t>
+            </a:r>
+            <a:r>
+              <a:rPr lang="en-US" dirty="0" smtClean="0">
+                <a:latin typeface="Menlo Regular"/>
+                <a:cs typeface="Menlo Regular"/>
+              </a:rPr>
+              <a:t>”);</a:t>
             </a:r>
           </a:p>
           <a:p>
             <a:pPr marL="0" indent="0">
               <a:buNone/>
             </a:pPr>
-            <a:endParaRPr lang="en-US" sz="2000" dirty="0" smtClean="0">
-              <a:latin typeface="Menlo Regular"/>
-              <a:cs typeface="Menlo Regular"/>
-            </a:endParaRPr>
-          </a:p>
-          <a:p>
-            <a:pPr marL="0" indent="0">
-              <a:buNone/>
-            </a:pPr>
-            <a:r>
-              <a:rPr lang="en-US" sz="2000" dirty="0" smtClean="0">
-                <a:latin typeface="Menlo Regular"/>
-                <a:cs typeface="Menlo Regular"/>
-              </a:rPr>
-              <a:t>// convert data set to Table and give name to fields</a:t>
-            </a:r>
-          </a:p>
-          <a:p>
-            <a:pPr marL="0" indent="0">
-              <a:buNone/>
-            </a:pPr>
-            <a:r>
-              <a:rPr lang="en-US" sz="2000" dirty="0" smtClean="0">
-                <a:latin typeface="Menlo Regular"/>
-                <a:cs typeface="Menlo Regular"/>
-              </a:rPr>
-              <a:t>Table t = </a:t>
-            </a:r>
-            <a:r>
-              <a:rPr lang="en-US" sz="2000" dirty="0" err="1" smtClean="0">
-                <a:latin typeface="Menlo Regular"/>
-                <a:cs typeface="Menlo Regular"/>
-              </a:rPr>
-              <a:t>tEnv.toTable</a:t>
-            </a:r>
-            <a:r>
-              <a:rPr lang="en-US" sz="2000" dirty="0" smtClean="0">
-                <a:latin typeface="Menlo Regular"/>
-                <a:cs typeface="Menlo Regular"/>
-              </a:rPr>
-              <a:t>(ds).as(“name, count, price”);</a:t>
-            </a:r>
-          </a:p>
-          <a:p>
-            <a:pPr marL="0" indent="0">
-              <a:buNone/>
-            </a:pPr>
-            <a:endParaRPr lang="en-US" sz="2000" dirty="0" smtClean="0">
-              <a:latin typeface="Menlo Regular"/>
-              <a:cs typeface="Menlo Regular"/>
-            </a:endParaRPr>
+            <a:r>
+              <a:rPr lang="en-US" dirty="0" smtClean="0">
+                <a:solidFill>
+                  <a:srgbClr val="7F7F7F"/>
+                </a:solidFill>
+                <a:latin typeface="Menlo Regular"/>
+                <a:cs typeface="Menlo Regular"/>
+              </a:rPr>
+              <a:t>  // join two table</a:t>
+            </a:r>
+          </a:p>
+          <a:p>
+            <a:r>
+              <a:rPr lang="en-US" dirty="0" smtClean="0">
+                <a:latin typeface="Menlo Regular"/>
+                <a:cs typeface="Menlo Regular"/>
+              </a:rPr>
+              <a:t>Table t6 = </a:t>
+            </a:r>
+            <a:r>
+              <a:rPr lang="en-US" dirty="0" err="1" smtClean="0">
+                <a:latin typeface="Menlo Regular"/>
+                <a:cs typeface="Menlo Regular"/>
+              </a:rPr>
+              <a:t>t.join</a:t>
+            </a:r>
+            <a:r>
+              <a:rPr lang="en-US" dirty="0" smtClean="0">
+                <a:latin typeface="Menlo Regular"/>
+                <a:cs typeface="Menlo Regular"/>
+              </a:rPr>
+              <a:t>(</a:t>
+            </a:r>
+            <a:r>
+              <a:rPr lang="en-US" dirty="0" err="1" smtClean="0">
+                <a:latin typeface="Menlo Regular"/>
+                <a:cs typeface="Menlo Regular"/>
+              </a:rPr>
+              <a:t>t.select</a:t>
+            </a:r>
+            <a:r>
+              <a:rPr lang="en-US" dirty="0" smtClean="0">
+                <a:latin typeface="Menlo Regular"/>
+                <a:cs typeface="Menlo Regular"/>
+              </a:rPr>
+              <a:t>(“author2,title2”))</a:t>
+            </a:r>
+            <a:br>
+              <a:rPr lang="en-US" dirty="0" smtClean="0">
+                <a:latin typeface="Menlo Regular"/>
+                <a:cs typeface="Menlo Regular"/>
+              </a:rPr>
+            </a:br>
+            <a:r>
+              <a:rPr lang="en-US" dirty="0" smtClean="0">
+                <a:latin typeface="Menlo Regular"/>
+                <a:cs typeface="Menlo Regular"/>
+              </a:rPr>
+              <a:t>            .where(“author = author2”)</a:t>
+            </a:r>
+            <a:br>
+              <a:rPr lang="en-US" dirty="0" smtClean="0">
+                <a:latin typeface="Menlo Regular"/>
+                <a:cs typeface="Menlo Regular"/>
+              </a:rPr>
+            </a:br>
+            <a:r>
+              <a:rPr lang="en-US" dirty="0" smtClean="0">
+                <a:latin typeface="Menlo Regular"/>
+                <a:cs typeface="Menlo Regular"/>
+              </a:rPr>
+              <a:t>            .select(“title, title2”);</a:t>
+            </a:r>
+          </a:p>
+          <a:p>
+            <a:endParaRPr lang="en-US" dirty="0" smtClean="0"/>
+          </a:p>
+          <a:p>
+            <a:endParaRPr lang="en-US" dirty="0"/>
           </a:p>
         </p:txBody>
       </p:sp>
@@ -5547,7 +5793,7 @@
     </p:spTree>
     <p:extLst>
       <p:ext uri="{BB962C8B-B14F-4D97-AF65-F5344CB8AC3E}">
-        <p14:creationId xmlns:p14="http://schemas.microsoft.com/office/powerpoint/2010/main" val="990429901"/>
+        <p14:creationId xmlns:p14="http://schemas.microsoft.com/office/powerpoint/2010/main" val="506144847"/>
       </p:ext>
     </p:extLst>
   </p:cSld>
@@ -5590,13 +5836,13 @@
           <a:lstStyle/>
           <a:p>
             <a:r>
-              <a:rPr lang="en-US" dirty="0" smtClean="0"/>
-              <a:t>Table to </a:t>
-            </a:r>
-            <a:r>
               <a:rPr lang="en-US" dirty="0" err="1" smtClean="0"/>
               <a:t>DataSet</a:t>
             </a:r>
+            <a:r>
+              <a:rPr lang="en-US" dirty="0" smtClean="0"/>
+              <a:t> to Table</a:t>
+            </a:r>
             <a:endParaRPr lang="en-US" dirty="0"/>
           </a:p>
         </p:txBody>
@@ -5611,51 +5857,35 @@
             <p:ph idx="1"/>
           </p:nvPr>
         </p:nvSpPr>
-        <p:spPr>
-          <a:xfrm>
-            <a:off x="457200" y="1474376"/>
-            <a:ext cx="8380310" cy="4881974"/>
-          </a:xfrm>
-        </p:spPr>
+        <p:spPr/>
         <p:txBody>
           <a:bodyPr>
-            <a:normAutofit fontScale="77500" lnSpcReduction="20000"/>
+            <a:normAutofit/>
           </a:bodyPr>
           <a:lstStyle/>
           <a:p>
-            <a:r>
-              <a:rPr lang="en-US" sz="3800" dirty="0" smtClean="0"/>
+            <a:pPr marL="0" indent="0">
+              <a:buNone/>
+            </a:pPr>
+            <a:r>
+              <a:rPr lang="en-US" dirty="0" smtClean="0"/>
               <a:t>Java </a:t>
             </a:r>
             <a:r>
-              <a:rPr lang="en-US" sz="3800" dirty="0" err="1" smtClean="0"/>
+              <a:rPr lang="en-US" dirty="0" err="1" smtClean="0"/>
               <a:t>DataSet</a:t>
             </a:r>
             <a:r>
-              <a:rPr lang="en-US" sz="3800" dirty="0" smtClean="0"/>
+              <a:rPr lang="en-US" dirty="0" smtClean="0"/>
               <a:t> API via </a:t>
             </a:r>
             <a:r>
-              <a:rPr lang="en-US" sz="3800" dirty="0" err="1" smtClean="0"/>
+              <a:rPr lang="en-US" dirty="0" err="1" smtClean="0"/>
               <a:t>TableEnvironment</a:t>
             </a:r>
-            <a:endParaRPr lang="en-US" sz="3800" dirty="0"/>
-          </a:p>
-          <a:p>
-            <a:r>
-              <a:rPr lang="en-US" sz="3800" dirty="0" smtClean="0"/>
-              <a:t>Convert to custom POJO data set</a:t>
-            </a:r>
-          </a:p>
-          <a:p>
-            <a:pPr lvl="1"/>
-            <a:r>
-              <a:rPr lang="en-US" sz="3400" dirty="0" err="1" smtClean="0"/>
-              <a:t>Pojo</a:t>
-            </a:r>
-            <a:r>
-              <a:rPr lang="en-US" sz="3400" dirty="0" smtClean="0"/>
-              <a:t> fields must map to Table fields</a:t>
+            <a:r>
+              <a:rPr lang="en-US" dirty="0" smtClean="0"/>
+              <a:t>:</a:t>
             </a:r>
           </a:p>
           <a:p>
@@ -5669,18 +5899,11 @@
               <a:buNone/>
             </a:pPr>
             <a:r>
-              <a:rPr lang="en-US" sz="2600" dirty="0">
-                <a:latin typeface="Menlo Regular"/>
-                <a:cs typeface="Menlo Regular"/>
-              </a:rPr>
-              <a:t>p</a:t>
-            </a:r>
-            <a:r>
-              <a:rPr lang="en-US" sz="2600" dirty="0" smtClean="0">
-                <a:latin typeface="Menlo Regular"/>
-                <a:cs typeface="Menlo Regular"/>
-              </a:rPr>
-              <a:t>ublic static class Stock {</a:t>
+              <a:rPr lang="en-US" sz="2000" dirty="0" smtClean="0">
+                <a:latin typeface="Menlo Regular"/>
+                <a:cs typeface="Menlo Regular"/>
+              </a:rPr>
+              <a:t>// data set</a:t>
             </a:r>
           </a:p>
           <a:p>
@@ -5688,121 +5911,46 @@
               <a:buNone/>
             </a:pPr>
             <a:r>
-              <a:rPr lang="en-US" sz="2600" dirty="0">
-                <a:latin typeface="Menlo Regular"/>
-                <a:cs typeface="Menlo Regular"/>
-              </a:rPr>
-              <a:t> </a:t>
-            </a:r>
-            <a:r>
-              <a:rPr lang="en-US" sz="2600" dirty="0" smtClean="0">
-                <a:latin typeface="Menlo Regular"/>
-                <a:cs typeface="Menlo Regular"/>
-              </a:rPr>
-              <a:t> public String name;</a:t>
+              <a:rPr lang="en-US" sz="2000" dirty="0" err="1">
+                <a:latin typeface="Menlo Regular"/>
+                <a:cs typeface="Menlo Regular"/>
+              </a:rPr>
+              <a:t>D</a:t>
+            </a:r>
+            <a:r>
+              <a:rPr lang="en-US" sz="2000" dirty="0" err="1" smtClean="0">
+                <a:latin typeface="Menlo Regular"/>
+                <a:cs typeface="Menlo Regular"/>
+              </a:rPr>
+              <a:t>ataSet</a:t>
+            </a:r>
+            <a:r>
+              <a:rPr lang="en-US" sz="2000" dirty="0" smtClean="0">
+                <a:latin typeface="Menlo Regular"/>
+                <a:cs typeface="Menlo Regular"/>
+              </a:rPr>
+              <a:t>&lt;Table3&lt;</a:t>
+            </a:r>
+            <a:r>
+              <a:rPr lang="en-US" sz="2000" dirty="0" err="1" smtClean="0">
+                <a:latin typeface="Menlo Regular"/>
+                <a:cs typeface="Menlo Regular"/>
+              </a:rPr>
+              <a:t>String,Long,Double</a:t>
+            </a:r>
+            <a:r>
+              <a:rPr lang="en-US" sz="2000" dirty="0" smtClean="0">
+                <a:latin typeface="Menlo Regular"/>
+                <a:cs typeface="Menlo Regular"/>
+              </a:rPr>
+              <a:t>&gt;&gt; ds = …;</a:t>
             </a:r>
           </a:p>
           <a:p>
             <a:pPr marL="0" indent="0">
               <a:buNone/>
             </a:pPr>
-            <a:r>
-              <a:rPr lang="en-US" sz="2600" dirty="0">
-                <a:latin typeface="Menlo Regular"/>
-                <a:cs typeface="Menlo Regular"/>
-              </a:rPr>
-              <a:t> </a:t>
-            </a:r>
-            <a:r>
-              <a:rPr lang="en-US" sz="2600" dirty="0" smtClean="0">
-                <a:latin typeface="Menlo Regular"/>
-                <a:cs typeface="Menlo Regular"/>
-              </a:rPr>
-              <a:t> public </a:t>
-            </a:r>
-            <a:r>
-              <a:rPr lang="en-US" sz="2600" dirty="0" err="1" smtClean="0">
-                <a:latin typeface="Menlo Regular"/>
-                <a:cs typeface="Menlo Regular"/>
-              </a:rPr>
-              <a:t>int</a:t>
-            </a:r>
-            <a:r>
-              <a:rPr lang="en-US" sz="2600" dirty="0" smtClean="0">
-                <a:latin typeface="Menlo Regular"/>
-                <a:cs typeface="Menlo Regular"/>
-              </a:rPr>
-              <a:t> count;</a:t>
-            </a:r>
-          </a:p>
-          <a:p>
-            <a:pPr marL="0" indent="0">
-              <a:buNone/>
-            </a:pPr>
-            <a:r>
-              <a:rPr lang="en-US" sz="2600" dirty="0">
-                <a:latin typeface="Menlo Regular"/>
-                <a:cs typeface="Menlo Regular"/>
-              </a:rPr>
-              <a:t> </a:t>
-            </a:r>
-            <a:r>
-              <a:rPr lang="en-US" sz="2600" dirty="0" smtClean="0">
-                <a:latin typeface="Menlo Regular"/>
-                <a:cs typeface="Menlo Regular"/>
-              </a:rPr>
-              <a:t> public double price;</a:t>
-            </a:r>
-          </a:p>
-          <a:p>
-            <a:pPr marL="0" indent="0">
-              <a:buNone/>
-            </a:pPr>
-            <a:r>
-              <a:rPr lang="en-US" sz="2600" dirty="0">
-                <a:latin typeface="Menlo Regular"/>
-                <a:cs typeface="Menlo Regular"/>
-              </a:rPr>
-              <a:t>}</a:t>
-            </a:r>
-          </a:p>
-          <a:p>
-            <a:pPr marL="0" indent="0">
-              <a:buNone/>
-            </a:pPr>
-            <a:endParaRPr lang="en-US" sz="2600" dirty="0" smtClean="0"/>
-          </a:p>
-          <a:p>
-            <a:pPr marL="0" indent="0">
-              <a:buNone/>
-            </a:pPr>
-            <a:r>
-              <a:rPr lang="en-US" sz="2600" dirty="0" smtClean="0">
-                <a:latin typeface="Menlo Regular"/>
-                <a:cs typeface="Menlo Regular"/>
-              </a:rPr>
-              <a:t>Table t = </a:t>
-            </a:r>
-            <a:r>
-              <a:rPr lang="en-US" sz="2600" dirty="0" err="1" smtClean="0">
-                <a:latin typeface="Menlo Regular"/>
-                <a:cs typeface="Menlo Regular"/>
-              </a:rPr>
-              <a:t>x.as</a:t>
-            </a:r>
-            <a:r>
-              <a:rPr lang="en-US" sz="2600" dirty="0" smtClean="0">
-                <a:latin typeface="Menlo Regular"/>
-                <a:cs typeface="Menlo Regular"/>
-              </a:rPr>
-              <a:t>(“name, count, price”);</a:t>
-            </a:r>
-          </a:p>
-          <a:p>
-            <a:pPr marL="0" indent="0">
-              <a:buNone/>
-            </a:pPr>
-            <a:endParaRPr lang="en-US" sz="2600" dirty="0" smtClean="0">
+            <a:endParaRPr lang="en-US" sz="2000" dirty="0" smtClean="0">
               <a:latin typeface="Menlo Regular"/>
               <a:cs typeface="Menlo Regular"/>
             </a:endParaRPr>
@@ -5812,60 +5960,20 @@
               <a:buNone/>
             </a:pPr>
             <a:r>
-              <a:rPr lang="en-US" sz="2600" dirty="0" err="1">
+              <a:rPr lang="en-US" sz="2000" dirty="0" smtClean="0">
+                <a:latin typeface="Menlo Regular"/>
+                <a:cs typeface="Menlo Regular"/>
+              </a:rPr>
+              <a:t>// get a </a:t>
+            </a:r>
+            <a:r>
+              <a:rPr lang="en-US" sz="2000" dirty="0" err="1" smtClean="0">
                 <a:latin typeface="Menlo Regular"/>
                 <a:cs typeface="Menlo Regular"/>
               </a:rPr>
               <a:t>TableEnvironment</a:t>
             </a:r>
-            <a:r>
-              <a:rPr lang="en-US" sz="2600" dirty="0">
-                <a:latin typeface="Menlo Regular"/>
-                <a:cs typeface="Menlo Regular"/>
-              </a:rPr>
-              <a:t> </a:t>
-            </a:r>
-            <a:r>
-              <a:rPr lang="en-US" sz="2600" dirty="0" err="1">
-                <a:latin typeface="Menlo Regular"/>
-                <a:cs typeface="Menlo Regular"/>
-              </a:rPr>
-              <a:t>tEnv</a:t>
-            </a:r>
-            <a:r>
-              <a:rPr lang="en-US" sz="2600" dirty="0">
-                <a:latin typeface="Menlo Regular"/>
-                <a:cs typeface="Menlo Regular"/>
-              </a:rPr>
-              <a:t> = new </a:t>
-            </a:r>
-            <a:r>
-              <a:rPr lang="en-US" sz="2600" dirty="0" err="1">
-                <a:latin typeface="Menlo Regular"/>
-                <a:cs typeface="Menlo Regular"/>
-              </a:rPr>
-              <a:t>TableEnvironment</a:t>
-            </a:r>
-            <a:r>
-              <a:rPr lang="en-US" sz="2600" dirty="0">
-                <a:latin typeface="Menlo Regular"/>
-                <a:cs typeface="Menlo Regular"/>
-              </a:rPr>
-              <a:t>()</a:t>
-            </a:r>
-            <a:r>
-              <a:rPr lang="en-US" sz="2600" dirty="0" smtClean="0">
-                <a:latin typeface="Menlo Regular"/>
-                <a:cs typeface="Menlo Regular"/>
-              </a:rPr>
-              <a:t>;</a:t>
-            </a:r>
-          </a:p>
-          <a:p>
-            <a:pPr marL="0" indent="0">
-              <a:buNone/>
-            </a:pPr>
-            <a:endParaRPr lang="en-US" sz="2600" dirty="0">
+            <a:endParaRPr lang="en-US" sz="2000" dirty="0">
               <a:latin typeface="Menlo Regular"/>
               <a:cs typeface="Menlo Regular"/>
             </a:endParaRPr>
@@ -5875,53 +5983,113 @@
               <a:buNone/>
             </a:pPr>
             <a:r>
-              <a:rPr lang="en-US" sz="2600" dirty="0" err="1" smtClean="0">
-                <a:latin typeface="Menlo Regular"/>
-                <a:cs typeface="Menlo Regular"/>
-              </a:rPr>
-              <a:t>DataSet</a:t>
-            </a:r>
-            <a:r>
-              <a:rPr lang="en-US" sz="2600" dirty="0" smtClean="0">
-                <a:latin typeface="Menlo Regular"/>
-                <a:cs typeface="Menlo Regular"/>
-              </a:rPr>
-              <a:t>&lt;Stock&gt; ds = </a:t>
-            </a:r>
-            <a:r>
-              <a:rPr lang="en-US" sz="2600" dirty="0" err="1" smtClean="0">
-                <a:latin typeface="Menlo Regular"/>
-                <a:cs typeface="Menlo Regular"/>
-              </a:rPr>
-              <a:t>tEnv.toSet</a:t>
-            </a:r>
-            <a:r>
-              <a:rPr lang="en-US" sz="2600" dirty="0" smtClean="0">
-                <a:latin typeface="Menlo Regular"/>
-                <a:cs typeface="Menlo Regular"/>
-              </a:rPr>
-              <a:t>(t, </a:t>
-            </a:r>
-            <a:r>
-              <a:rPr lang="en-US" sz="2600" dirty="0" err="1" smtClean="0">
-                <a:latin typeface="Menlo Regular"/>
-                <a:cs typeface="Menlo Regular"/>
-              </a:rPr>
-              <a:t>Stock.class</a:t>
-            </a:r>
-            <a:r>
-              <a:rPr lang="en-US" sz="2600" dirty="0" smtClean="0">
-                <a:latin typeface="Menlo Regular"/>
-                <a:cs typeface="Menlo Regular"/>
-              </a:rPr>
-              <a:t>);</a:t>
+              <a:rPr lang="en-US" sz="2000" dirty="0" err="1" smtClean="0">
+                <a:latin typeface="Menlo Regular"/>
+                <a:cs typeface="Menlo Regular"/>
+              </a:rPr>
+              <a:t>TableEnvironment</a:t>
+            </a:r>
+            <a:r>
+              <a:rPr lang="en-US" sz="2000" dirty="0" smtClean="0">
+                <a:latin typeface="Menlo Regular"/>
+                <a:cs typeface="Menlo Regular"/>
+              </a:rPr>
+              <a:t> </a:t>
+            </a:r>
+            <a:r>
+              <a:rPr lang="en-US" sz="2000" dirty="0" err="1" smtClean="0">
+                <a:latin typeface="Menlo Regular"/>
+                <a:cs typeface="Menlo Regular"/>
+              </a:rPr>
+              <a:t>tEnv</a:t>
+            </a:r>
+            <a:r>
+              <a:rPr lang="en-US" sz="2000" dirty="0" smtClean="0">
+                <a:latin typeface="Menlo Regular"/>
+                <a:cs typeface="Menlo Regular"/>
+              </a:rPr>
+              <a:t> = new </a:t>
+            </a:r>
+            <a:r>
+              <a:rPr lang="en-US" sz="2000" dirty="0" err="1" smtClean="0">
+                <a:latin typeface="Menlo Regular"/>
+                <a:cs typeface="Menlo Regular"/>
+              </a:rPr>
+              <a:t>TableEnvironment</a:t>
+            </a:r>
+            <a:r>
+              <a:rPr lang="en-US" sz="2000" dirty="0" smtClean="0">
+                <a:latin typeface="Menlo Regular"/>
+                <a:cs typeface="Menlo Regular"/>
+              </a:rPr>
+              <a:t>();</a:t>
             </a:r>
           </a:p>
           <a:p>
             <a:pPr marL="0" indent="0">
               <a:buNone/>
             </a:pPr>
-            <a:endParaRPr lang="en-US" sz="2000" dirty="0">
+            <a:endParaRPr lang="en-US" sz="2000" dirty="0" smtClean="0">
+              <a:latin typeface="Menlo Regular"/>
+              <a:cs typeface="Menlo Regular"/>
+            </a:endParaRPr>
+          </a:p>
+          <a:p>
+            <a:pPr marL="0" indent="0">
+              <a:buNone/>
+            </a:pPr>
+            <a:r>
+              <a:rPr lang="en-US" sz="2000" dirty="0" smtClean="0">
+                <a:latin typeface="Menlo Regular"/>
+                <a:cs typeface="Menlo Regular"/>
+              </a:rPr>
+              <a:t>// convert data set to Table and give name to fields</a:t>
+            </a:r>
+          </a:p>
+          <a:p>
+            <a:pPr marL="0" indent="0">
+              <a:buNone/>
+            </a:pPr>
+            <a:r>
+              <a:rPr lang="en-US" sz="2000" dirty="0" smtClean="0">
+                <a:latin typeface="Menlo Regular"/>
+                <a:cs typeface="Menlo Regular"/>
+              </a:rPr>
+              <a:t>Table t = </a:t>
+            </a:r>
+            <a:r>
+              <a:rPr lang="en-US" sz="2000" dirty="0" err="1" smtClean="0">
+                <a:latin typeface="Menlo Regular"/>
+                <a:cs typeface="Menlo Regular"/>
+              </a:rPr>
+              <a:t>tEnv.fromDataSet</a:t>
+            </a:r>
+            <a:r>
+              <a:rPr lang="en-US" sz="2000" dirty="0" smtClean="0">
+                <a:latin typeface="Menlo Regular"/>
+                <a:cs typeface="Menlo Regular"/>
+              </a:rPr>
+              <a:t>(ds)</a:t>
+            </a:r>
+            <a:br>
+              <a:rPr lang="en-US" sz="2000" dirty="0" smtClean="0">
+                <a:latin typeface="Menlo Regular"/>
+                <a:cs typeface="Menlo Regular"/>
+              </a:rPr>
+            </a:br>
+            <a:r>
+              <a:rPr lang="en-US" sz="2000" dirty="0" smtClean="0">
+                <a:latin typeface="Menlo Regular"/>
+                <a:cs typeface="Menlo Regular"/>
+              </a:rPr>
+              <a:t>              .as(“name, count, price”);</a:t>
+            </a:r>
+          </a:p>
+          <a:p>
+            <a:pPr marL="0" indent="0">
+              <a:buNone/>
+            </a:pPr>
+            <a:endParaRPr lang="en-US" sz="2000" dirty="0" smtClean="0">
               <a:latin typeface="Menlo Regular"/>
               <a:cs typeface="Menlo Regular"/>
             </a:endParaRPr>
@@ -5967,7 +6135,7 @@
     </p:spTree>
     <p:extLst>
       <p:ext uri="{BB962C8B-B14F-4D97-AF65-F5344CB8AC3E}">
-        <p14:creationId xmlns:p14="http://schemas.microsoft.com/office/powerpoint/2010/main" val="900058771"/>
+        <p14:creationId xmlns:p14="http://schemas.microsoft.com/office/powerpoint/2010/main" val="990429901"/>
       </p:ext>
     </p:extLst>
   </p:cSld>
@@ -6039,49 +6207,151 @@
         </p:spPr>
         <p:txBody>
           <a:bodyPr>
-            <a:normAutofit/>
+            <a:normAutofit fontScale="77500" lnSpcReduction="20000"/>
           </a:bodyPr>
           <a:lstStyle/>
           <a:p>
+            <a:r>
+              <a:rPr lang="en-US" sz="3800" dirty="0" smtClean="0"/>
+              <a:t>Java </a:t>
+            </a:r>
+            <a:r>
+              <a:rPr lang="en-US" sz="3800" dirty="0" err="1" smtClean="0"/>
+              <a:t>DataSet</a:t>
+            </a:r>
+            <a:r>
+              <a:rPr lang="en-US" sz="3800" dirty="0" smtClean="0"/>
+              <a:t> API via </a:t>
+            </a:r>
+            <a:r>
+              <a:rPr lang="en-US" sz="3800" dirty="0" err="1" smtClean="0"/>
+              <a:t>TableEnvironment</a:t>
+            </a:r>
+            <a:endParaRPr lang="en-US" sz="3800" dirty="0"/>
+          </a:p>
+          <a:p>
+            <a:r>
+              <a:rPr lang="en-US" sz="3800" dirty="0" smtClean="0"/>
+              <a:t>Convert to custom POJO data set</a:t>
+            </a:r>
+          </a:p>
+          <a:p>
+            <a:pPr lvl="1"/>
+            <a:r>
+              <a:rPr lang="en-US" sz="3400" dirty="0" err="1" smtClean="0"/>
+              <a:t>Pojo</a:t>
+            </a:r>
+            <a:r>
+              <a:rPr lang="en-US" sz="3400" dirty="0" smtClean="0"/>
+              <a:t> fields must map to Table fields</a:t>
+            </a:r>
+          </a:p>
+          <a:p>
             <a:pPr marL="0" indent="0">
               <a:buNone/>
             </a:pPr>
-            <a:r>
-              <a:rPr lang="en-US" dirty="0" smtClean="0"/>
-              <a:t>Java </a:t>
-            </a:r>
-            <a:r>
-              <a:rPr lang="en-US" dirty="0" err="1" smtClean="0"/>
-              <a:t>DataSet</a:t>
-            </a:r>
-            <a:r>
-              <a:rPr lang="en-US" dirty="0" smtClean="0"/>
-              <a:t> API via </a:t>
-            </a:r>
-            <a:r>
-              <a:rPr lang="en-US" dirty="0" err="1" smtClean="0"/>
-              <a:t>TableEnvironment</a:t>
-            </a:r>
-            <a:endParaRPr lang="en-US" dirty="0"/>
-          </a:p>
-          <a:p>
-            <a:r>
-              <a:rPr lang="en-US" dirty="0" smtClean="0"/>
-              <a:t>Convert to </a:t>
-            </a:r>
-            <a:r>
-              <a:rPr lang="en-US" dirty="0" err="1" smtClean="0"/>
-              <a:t>DataSet</a:t>
-            </a:r>
-            <a:r>
-              <a:rPr lang="en-US" dirty="0" smtClean="0"/>
-              <a:t>&lt;Row&gt;</a:t>
-            </a:r>
-          </a:p>
-          <a:p>
-            <a:r>
-              <a:rPr lang="en-US" dirty="0" smtClean="0"/>
-              <a:t>Most valuable for printing</a:t>
+            <a:endParaRPr lang="en-US" sz="1800" dirty="0" smtClean="0"/>
+          </a:p>
+          <a:p>
+            <a:pPr marL="0" indent="0">
+              <a:buNone/>
+            </a:pPr>
+            <a:r>
+              <a:rPr lang="en-US" sz="2600" dirty="0">
+                <a:latin typeface="Menlo Regular"/>
+                <a:cs typeface="Menlo Regular"/>
+              </a:rPr>
+              <a:t>p</a:t>
+            </a:r>
+            <a:r>
+              <a:rPr lang="en-US" sz="2600" dirty="0" smtClean="0">
+                <a:latin typeface="Menlo Regular"/>
+                <a:cs typeface="Menlo Regular"/>
+              </a:rPr>
+              <a:t>ublic static class Stock {</a:t>
+            </a:r>
+          </a:p>
+          <a:p>
+            <a:pPr marL="0" indent="0">
+              <a:buNone/>
+            </a:pPr>
+            <a:r>
+              <a:rPr lang="en-US" sz="2600" dirty="0">
+                <a:latin typeface="Menlo Regular"/>
+                <a:cs typeface="Menlo Regular"/>
+              </a:rPr>
+              <a:t> </a:t>
+            </a:r>
+            <a:r>
+              <a:rPr lang="en-US" sz="2600" dirty="0" smtClean="0">
+                <a:latin typeface="Menlo Regular"/>
+                <a:cs typeface="Menlo Regular"/>
+              </a:rPr>
+              <a:t> public String name;</a:t>
+            </a:r>
+          </a:p>
+          <a:p>
+            <a:pPr marL="0" indent="0">
+              <a:buNone/>
+            </a:pPr>
+            <a:r>
+              <a:rPr lang="en-US" sz="2600" dirty="0">
+                <a:latin typeface="Menlo Regular"/>
+                <a:cs typeface="Menlo Regular"/>
+              </a:rPr>
+              <a:t> </a:t>
+            </a:r>
+            <a:r>
+              <a:rPr lang="en-US" sz="2600" dirty="0" smtClean="0">
+                <a:latin typeface="Menlo Regular"/>
+                <a:cs typeface="Menlo Regular"/>
+              </a:rPr>
+              <a:t> public </a:t>
+            </a:r>
+            <a:r>
+              <a:rPr lang="en-US" sz="2600" dirty="0" err="1" smtClean="0">
+                <a:latin typeface="Menlo Regular"/>
+                <a:cs typeface="Menlo Regular"/>
+              </a:rPr>
+              <a:t>int</a:t>
+            </a:r>
+            <a:r>
+              <a:rPr lang="en-US" sz="2600" dirty="0" smtClean="0">
+                <a:latin typeface="Menlo Regular"/>
+                <a:cs typeface="Menlo Regular"/>
+              </a:rPr>
+              <a:t> count;</a:t>
+            </a:r>
+          </a:p>
+          <a:p>
+            <a:pPr marL="0" indent="0">
+              <a:buNone/>
+            </a:pPr>
+            <a:r>
+              <a:rPr lang="en-US" sz="2600" dirty="0">
+                <a:latin typeface="Menlo Regular"/>
+                <a:cs typeface="Menlo Regular"/>
+              </a:rPr>
+              <a:t> </a:t>
+            </a:r>
+            <a:r>
+              <a:rPr lang="en-US" sz="2600" dirty="0" smtClean="0">
+                <a:latin typeface="Menlo Regular"/>
+                <a:cs typeface="Menlo Regular"/>
+              </a:rPr>
+              <a:t> public double price;</a:t>
+            </a:r>
+          </a:p>
+          <a:p>
+            <a:pPr marL="0" indent="0">
+              <a:buNone/>
+            </a:pPr>
+            <a:r>
+              <a:rPr lang="en-US" sz="2600" dirty="0">
+                <a:latin typeface="Menlo Regular"/>
+                <a:cs typeface="Menlo Regular"/>
+              </a:rPr>
+              <a:t>}</a:t>
             </a:r>
           </a:p>
           <a:p>
@@ -6095,21 +6365,21 @@
               <a:buNone/>
             </a:pPr>
             <a:r>
-              <a:rPr lang="en-US" sz="2200" dirty="0" smtClean="0">
+              <a:rPr lang="en-US" sz="2600" dirty="0" smtClean="0">
                 <a:latin typeface="Menlo Regular"/>
                 <a:cs typeface="Menlo Regular"/>
               </a:rPr>
               <a:t>Table t = </a:t>
             </a:r>
             <a:r>
-              <a:rPr lang="en-US" sz="2200" dirty="0" err="1" smtClean="0">
+              <a:rPr lang="en-US" sz="2600" dirty="0" err="1" smtClean="0">
                 <a:latin typeface="Menlo Regular"/>
                 <a:cs typeface="Menlo Regular"/>
               </a:rPr>
               <a:t>x.as</a:t>
             </a:r>
             <a:r>
-              <a:rPr lang="en-US" sz="2200" dirty="0" smtClean="0">
+              <a:rPr lang="en-US" sz="2600" dirty="0" smtClean="0">
                 <a:latin typeface="Menlo Regular"/>
                 <a:cs typeface="Menlo Regular"/>
               </a:rPr>
@@ -6120,80 +6390,119 @@
             <a:pPr marL="0" indent="0">
               <a:buNone/>
             </a:pPr>
-            <a:r>
-              <a:rPr lang="en-US" sz="2200" dirty="0" err="1">
+            <a:endParaRPr lang="en-US" sz="2600" dirty="0" smtClean="0">
+              <a:latin typeface="Menlo Regular"/>
+              <a:cs typeface="Menlo Regular"/>
+            </a:endParaRPr>
+          </a:p>
+          <a:p>
+            <a:pPr marL="0" indent="0">
+              <a:buNone/>
+            </a:pPr>
+            <a:r>
+              <a:rPr lang="en-US" sz="2600" dirty="0" err="1">
                 <a:latin typeface="Menlo Regular"/>
                 <a:cs typeface="Menlo Regular"/>
               </a:rPr>
               <a:t>TableEnvironment</a:t>
             </a:r>
             <a:r>
-              <a:rPr lang="en-US" sz="2200" dirty="0">
+              <a:rPr lang="en-US" sz="2600" dirty="0">
                 <a:latin typeface="Menlo Regular"/>
                 <a:cs typeface="Menlo Regular"/>
               </a:rPr>
               <a:t> </a:t>
             </a:r>
             <a:r>
-              <a:rPr lang="en-US" sz="2200" dirty="0" err="1">
+              <a:rPr lang="en-US" sz="2600" dirty="0" err="1">
                 <a:latin typeface="Menlo Regular"/>
                 <a:cs typeface="Menlo Regular"/>
               </a:rPr>
               <a:t>tEnv</a:t>
             </a:r>
             <a:r>
-              <a:rPr lang="en-US" sz="2200" dirty="0">
+              <a:rPr lang="en-US" sz="2600" dirty="0">
                 <a:latin typeface="Menlo Regular"/>
                 <a:cs typeface="Menlo Regular"/>
               </a:rPr>
               <a:t> = new </a:t>
             </a:r>
             <a:r>
-              <a:rPr lang="en-US" sz="2200" dirty="0" err="1">
+              <a:rPr lang="en-US" sz="2600" dirty="0" err="1">
                 <a:latin typeface="Menlo Regular"/>
                 <a:cs typeface="Menlo Regular"/>
               </a:rPr>
               <a:t>TableEnvironment</a:t>
             </a:r>
             <a:r>
-              <a:rPr lang="en-US" sz="2200" dirty="0">
-                <a:latin typeface="Menlo Regular"/>
-                <a:cs typeface="Menlo Regular"/>
-              </a:rPr>
-              <a:t>();</a:t>
+              <a:rPr lang="en-US" sz="2600" dirty="0">
+                <a:latin typeface="Menlo Regular"/>
+                <a:cs typeface="Menlo Regular"/>
+              </a:rPr>
+              <a:t>()</a:t>
+            </a:r>
+            <a:r>
+              <a:rPr lang="en-US" sz="2600" dirty="0" smtClean="0">
+                <a:latin typeface="Menlo Regular"/>
+                <a:cs typeface="Menlo Regular"/>
+              </a:rPr>
+              <a:t>;</a:t>
             </a:r>
           </a:p>
           <a:p>
             <a:pPr marL="0" indent="0">
               <a:buNone/>
             </a:pPr>
-            <a:r>
-              <a:rPr lang="en-US" sz="2200" dirty="0" err="1" smtClean="0">
-                <a:latin typeface="Menlo Regular"/>
-                <a:cs typeface="Menlo Regular"/>
-              </a:rPr>
-              <a:t>tEnv.toSet</a:t>
-            </a:r>
-            <a:r>
-              <a:rPr lang="en-US" sz="2200" dirty="0" smtClean="0">
+            <a:endParaRPr lang="en-US" sz="2600" dirty="0">
+              <a:latin typeface="Menlo Regular"/>
+              <a:cs typeface="Menlo Regular"/>
+            </a:endParaRPr>
+          </a:p>
+          <a:p>
+            <a:pPr marL="0" indent="0">
+              <a:buNone/>
+            </a:pPr>
+            <a:r>
+              <a:rPr lang="en-US" sz="2600" dirty="0" err="1" smtClean="0">
+                <a:latin typeface="Menlo Regular"/>
+                <a:cs typeface="Menlo Regular"/>
+              </a:rPr>
+              <a:t>DataSet</a:t>
+            </a:r>
+            <a:r>
+              <a:rPr lang="en-US" sz="2600" dirty="0" smtClean="0">
+                <a:latin typeface="Menlo Regular"/>
+                <a:cs typeface="Menlo Regular"/>
+              </a:rPr>
+              <a:t>&lt;Stock&gt; ds = </a:t>
+            </a:r>
+            <a:r>
+              <a:rPr lang="en-US" sz="2600" dirty="0" err="1" smtClean="0">
+                <a:latin typeface="Menlo Regular"/>
+                <a:cs typeface="Menlo Regular"/>
+              </a:rPr>
+              <a:t>tEnv.toDataSet</a:t>
+            </a:r>
+            <a:r>
+              <a:rPr lang="en-US" sz="2600" dirty="0" smtClean="0">
                 <a:latin typeface="Menlo Regular"/>
                 <a:cs typeface="Menlo Regular"/>
               </a:rPr>
               <a:t>(t, </a:t>
             </a:r>
             <a:r>
-              <a:rPr lang="en-US" sz="2200" dirty="0" err="1" smtClean="0">
-                <a:latin typeface="Menlo Regular"/>
-                <a:cs typeface="Menlo Regular"/>
-              </a:rPr>
-              <a:t>Row.class</a:t>
-            </a:r>
-            <a:r>
-              <a:rPr lang="en-US" sz="2200" dirty="0" smtClean="0">
-                <a:latin typeface="Menlo Regular"/>
-                <a:cs typeface="Menlo Regular"/>
-              </a:rPr>
-              <a:t>).print();</a:t>
+              <a:rPr lang="en-US" sz="2600" dirty="0" err="1" smtClean="0">
+                <a:latin typeface="Menlo Regular"/>
+                <a:cs typeface="Menlo Regular"/>
+              </a:rPr>
+              <a:t>Stock.class</a:t>
+            </a:r>
+            <a:r>
+              <a:rPr lang="en-US" sz="2600" dirty="0" smtClean="0">
+                <a:latin typeface="Menlo Regular"/>
+                <a:cs typeface="Menlo Regular"/>
+              </a:rPr>
+              <a:t>);</a:t>
             </a:r>
           </a:p>
           <a:p>
@@ -6246,7 +6555,7 @@
     </p:spTree>
     <p:extLst>
       <p:ext uri="{BB962C8B-B14F-4D97-AF65-F5344CB8AC3E}">
-        <p14:creationId xmlns:p14="http://schemas.microsoft.com/office/powerpoint/2010/main" val="1002752682"/>
+        <p14:creationId xmlns:p14="http://schemas.microsoft.com/office/powerpoint/2010/main" val="900058771"/>
       </p:ext>
     </p:extLst>
   </p:cSld>

</xml_diff>